<commit_message>
Updated docs and Portfolio Overview
Updated documentation and Portfolio Overview narrative.
</commit_message>
<xml_diff>
--- a/docs/portfolio-overview/GulfToBay_Modernization_ArchitectureDiagram.pptx
+++ b/docs/portfolio-overview/GulfToBay_Modernization_ArchitectureDiagram.pptx
@@ -243,7 +243,7 @@
           <a:p>
             <a:fld id="{AA4FBA11-CFA1-47AE-BAE9-6005F939AD7F}" type="datetimeFigureOut">
               <a:rPr lang="en-US" smtClean="0"/>
-              <a:t>1/26/2026</a:t>
+              <a:t>2/2/2026</a:t>
             </a:fld>
             <a:endParaRPr lang="en-US"/>
           </a:p>
@@ -413,7 +413,7 @@
           <a:p>
             <a:fld id="{AA4FBA11-CFA1-47AE-BAE9-6005F939AD7F}" type="datetimeFigureOut">
               <a:rPr lang="en-US" smtClean="0"/>
-              <a:t>1/26/2026</a:t>
+              <a:t>2/2/2026</a:t>
             </a:fld>
             <a:endParaRPr lang="en-US"/>
           </a:p>
@@ -593,7 +593,7 @@
           <a:p>
             <a:fld id="{AA4FBA11-CFA1-47AE-BAE9-6005F939AD7F}" type="datetimeFigureOut">
               <a:rPr lang="en-US" smtClean="0"/>
-              <a:t>1/26/2026</a:t>
+              <a:t>2/2/2026</a:t>
             </a:fld>
             <a:endParaRPr lang="en-US"/>
           </a:p>
@@ -763,7 +763,7 @@
           <a:p>
             <a:fld id="{AA4FBA11-CFA1-47AE-BAE9-6005F939AD7F}" type="datetimeFigureOut">
               <a:rPr lang="en-US" smtClean="0"/>
-              <a:t>1/26/2026</a:t>
+              <a:t>2/2/2026</a:t>
             </a:fld>
             <a:endParaRPr lang="en-US"/>
           </a:p>
@@ -1007,7 +1007,7 @@
           <a:p>
             <a:fld id="{AA4FBA11-CFA1-47AE-BAE9-6005F939AD7F}" type="datetimeFigureOut">
               <a:rPr lang="en-US" smtClean="0"/>
-              <a:t>1/26/2026</a:t>
+              <a:t>2/2/2026</a:t>
             </a:fld>
             <a:endParaRPr lang="en-US"/>
           </a:p>
@@ -1239,7 +1239,7 @@
           <a:p>
             <a:fld id="{AA4FBA11-CFA1-47AE-BAE9-6005F939AD7F}" type="datetimeFigureOut">
               <a:rPr lang="en-US" smtClean="0"/>
-              <a:t>1/26/2026</a:t>
+              <a:t>2/2/2026</a:t>
             </a:fld>
             <a:endParaRPr lang="en-US"/>
           </a:p>
@@ -1606,7 +1606,7 @@
           <a:p>
             <a:fld id="{AA4FBA11-CFA1-47AE-BAE9-6005F939AD7F}" type="datetimeFigureOut">
               <a:rPr lang="en-US" smtClean="0"/>
-              <a:t>1/26/2026</a:t>
+              <a:t>2/2/2026</a:t>
             </a:fld>
             <a:endParaRPr lang="en-US"/>
           </a:p>
@@ -1724,7 +1724,7 @@
           <a:p>
             <a:fld id="{AA4FBA11-CFA1-47AE-BAE9-6005F939AD7F}" type="datetimeFigureOut">
               <a:rPr lang="en-US" smtClean="0"/>
-              <a:t>1/26/2026</a:t>
+              <a:t>2/2/2026</a:t>
             </a:fld>
             <a:endParaRPr lang="en-US"/>
           </a:p>
@@ -1819,7 +1819,7 @@
           <a:p>
             <a:fld id="{AA4FBA11-CFA1-47AE-BAE9-6005F939AD7F}" type="datetimeFigureOut">
               <a:rPr lang="en-US" smtClean="0"/>
-              <a:t>1/26/2026</a:t>
+              <a:t>2/2/2026</a:t>
             </a:fld>
             <a:endParaRPr lang="en-US"/>
           </a:p>
@@ -2096,7 +2096,7 @@
           <a:p>
             <a:fld id="{AA4FBA11-CFA1-47AE-BAE9-6005F939AD7F}" type="datetimeFigureOut">
               <a:rPr lang="en-US" smtClean="0"/>
-              <a:t>1/26/2026</a:t>
+              <a:t>2/2/2026</a:t>
             </a:fld>
             <a:endParaRPr lang="en-US"/>
           </a:p>
@@ -2353,7 +2353,7 @@
           <a:p>
             <a:fld id="{AA4FBA11-CFA1-47AE-BAE9-6005F939AD7F}" type="datetimeFigureOut">
               <a:rPr lang="en-US" smtClean="0"/>
-              <a:t>1/26/2026</a:t>
+              <a:t>2/2/2026</a:t>
             </a:fld>
             <a:endParaRPr lang="en-US"/>
           </a:p>
@@ -2566,7 +2566,7 @@
           <a:p>
             <a:fld id="{AA4FBA11-CFA1-47AE-BAE9-6005F939AD7F}" type="datetimeFigureOut">
               <a:rPr lang="en-US" smtClean="0"/>
-              <a:t>1/26/2026</a:t>
+              <a:t>2/2/2026</a:t>
             </a:fld>
             <a:endParaRPr lang="en-US"/>
           </a:p>
@@ -3072,7 +3072,7 @@
             <a:pPr algn="ctr"/>
             <a:r>
               <a:rPr lang="en-US" dirty="0"/>
-              <a:t>DATA SOURCES</a:t>
+              <a:t>MODERN DATA SOURCES</a:t>
             </a:r>
           </a:p>
           <a:p>
@@ -3181,7 +3181,7 @@
             </a:pPr>
             <a:r>
               <a:rPr lang="en-US" dirty="0"/>
-              <a:t>Python ETL Scripts</a:t>
+              <a:t>Fabric Lakehouse Python Scripts for ETL</a:t>
             </a:r>
           </a:p>
           <a:p>
@@ -3262,7 +3262,7 @@
             <a:pPr algn="ctr"/>
             <a:r>
               <a:rPr lang="en-US" dirty="0"/>
-              <a:t>SEMANTIC MODELING LAYER</a:t>
+              <a:t>MODERN SEMANTIC MODELING LAYER</a:t>
             </a:r>
           </a:p>
           <a:p>

</xml_diff>